<commit_message>
update automation assignment to include ChatGPT experiment
</commit_message>
<xml_diff>
--- a/docs/slides/class/04-Protocols.pptx
+++ b/docs/slides/class/04-Protocols.pptx
@@ -242,7 +242,7 @@
           <a:p>
             <a:fld id="{CEDAEFA1-2302-CF41-B3D2-D7622FF3D015}" type="datetimeFigureOut">
               <a:rPr lang="en-US" smtClean="0"/>
-              <a:t>1/5/23</a:t>
+              <a:t>1/8/24</a:t>
             </a:fld>
             <a:endParaRPr lang="en-US"/>
           </a:p>
@@ -3753,7 +3753,7 @@
               <a:defRPr/>
             </a:pPr>
             <a:r>
-              <a:rPr lang="en-US" altLang="zh-CN">
+              <a:rPr lang="en-US" altLang="zh-CN" dirty="0">
                 <a:cs typeface="+mn-cs"/>
               </a:rPr>
               <a:t>RFC 2535 discusses these RRs in detail.</a:t>
@@ -3763,7 +3763,7 @@
             <a:pPr eaLnBrk="1" hangingPunct="1">
               <a:defRPr/>
             </a:pPr>
-            <a:endParaRPr lang="en-US" altLang="zh-CN">
+            <a:endParaRPr lang="en-US" altLang="zh-CN" dirty="0">
               <a:cs typeface="+mn-cs"/>
             </a:endParaRPr>
           </a:p>
@@ -3772,7 +3772,7 @@
               <a:defRPr/>
             </a:pPr>
             <a:r>
-              <a:rPr lang="en-US" altLang="zh-CN">
+              <a:rPr lang="en-US" altLang="zh-CN" dirty="0">
                 <a:cs typeface="+mn-cs"/>
               </a:rPr>
               <a:t>CERT RR is outside the scope of this course.</a:t>
@@ -4051,7 +4051,7 @@
           <a:p>
             <a:fld id="{C9E664E8-8019-2444-AEBA-CE692A70D4C8}" type="datetimeFigureOut">
               <a:rPr lang="en-US" smtClean="0"/>
-              <a:t>1/5/23</a:t>
+              <a:t>1/8/24</a:t>
             </a:fld>
             <a:endParaRPr lang="en-US"/>
           </a:p>
@@ -4249,7 +4249,7 @@
           <a:p>
             <a:fld id="{C9E664E8-8019-2444-AEBA-CE692A70D4C8}" type="datetimeFigureOut">
               <a:rPr lang="en-US" smtClean="0"/>
-              <a:t>1/5/23</a:t>
+              <a:t>1/8/24</a:t>
             </a:fld>
             <a:endParaRPr lang="en-US"/>
           </a:p>
@@ -4457,7 +4457,7 @@
           <a:p>
             <a:fld id="{C9E664E8-8019-2444-AEBA-CE692A70D4C8}" type="datetimeFigureOut">
               <a:rPr lang="en-US" smtClean="0"/>
-              <a:t>1/5/23</a:t>
+              <a:t>1/8/24</a:t>
             </a:fld>
             <a:endParaRPr lang="en-US"/>
           </a:p>
@@ -5143,7 +5143,7 @@
           <a:p>
             <a:fld id="{C9E664E8-8019-2444-AEBA-CE692A70D4C8}" type="datetimeFigureOut">
               <a:rPr lang="en-US" smtClean="0"/>
-              <a:t>1/5/23</a:t>
+              <a:t>1/8/24</a:t>
             </a:fld>
             <a:endParaRPr lang="en-US"/>
           </a:p>
@@ -5418,7 +5418,7 @@
           <a:p>
             <a:fld id="{C9E664E8-8019-2444-AEBA-CE692A70D4C8}" type="datetimeFigureOut">
               <a:rPr lang="en-US" smtClean="0"/>
-              <a:t>1/5/23</a:t>
+              <a:t>1/8/24</a:t>
             </a:fld>
             <a:endParaRPr lang="en-US"/>
           </a:p>
@@ -5683,7 +5683,7 @@
           <a:p>
             <a:fld id="{C9E664E8-8019-2444-AEBA-CE692A70D4C8}" type="datetimeFigureOut">
               <a:rPr lang="en-US" smtClean="0"/>
-              <a:t>1/5/23</a:t>
+              <a:t>1/8/24</a:t>
             </a:fld>
             <a:endParaRPr lang="en-US"/>
           </a:p>
@@ -6095,7 +6095,7 @@
           <a:p>
             <a:fld id="{C9E664E8-8019-2444-AEBA-CE692A70D4C8}" type="datetimeFigureOut">
               <a:rPr lang="en-US" smtClean="0"/>
-              <a:t>1/5/23</a:t>
+              <a:t>1/8/24</a:t>
             </a:fld>
             <a:endParaRPr lang="en-US"/>
           </a:p>
@@ -6236,7 +6236,7 @@
           <a:p>
             <a:fld id="{C9E664E8-8019-2444-AEBA-CE692A70D4C8}" type="datetimeFigureOut">
               <a:rPr lang="en-US" smtClean="0"/>
-              <a:t>1/5/23</a:t>
+              <a:t>1/8/24</a:t>
             </a:fld>
             <a:endParaRPr lang="en-US"/>
           </a:p>
@@ -6349,7 +6349,7 @@
           <a:p>
             <a:fld id="{C9E664E8-8019-2444-AEBA-CE692A70D4C8}" type="datetimeFigureOut">
               <a:rPr lang="en-US" smtClean="0"/>
-              <a:t>1/5/23</a:t>
+              <a:t>1/8/24</a:t>
             </a:fld>
             <a:endParaRPr lang="en-US"/>
           </a:p>
@@ -6660,7 +6660,7 @@
           <a:p>
             <a:fld id="{C9E664E8-8019-2444-AEBA-CE692A70D4C8}" type="datetimeFigureOut">
               <a:rPr lang="en-US" smtClean="0"/>
-              <a:t>1/5/23</a:t>
+              <a:t>1/8/24</a:t>
             </a:fld>
             <a:endParaRPr lang="en-US"/>
           </a:p>
@@ -6948,7 +6948,7 @@
           <a:p>
             <a:fld id="{C9E664E8-8019-2444-AEBA-CE692A70D4C8}" type="datetimeFigureOut">
               <a:rPr lang="en-US" smtClean="0"/>
-              <a:t>1/5/23</a:t>
+              <a:t>1/8/24</a:t>
             </a:fld>
             <a:endParaRPr lang="en-US"/>
           </a:p>
@@ -7189,7 +7189,7 @@
           <a:p>
             <a:fld id="{C9E664E8-8019-2444-AEBA-CE692A70D4C8}" type="datetimeFigureOut">
               <a:rPr lang="en-US" smtClean="0"/>
-              <a:t>1/5/23</a:t>
+              <a:t>1/8/24</a:t>
             </a:fld>
             <a:endParaRPr lang="en-US"/>
           </a:p>

</xml_diff>